<commit_message>
complete ibatis mapping /
</commit_message>
<xml_diff>
--- a/Danceple/DB설계.pptx
+++ b/Danceple/DB설계.pptx
@@ -294,7 +294,7 @@
           <a:p>
             <a:fld id="{0649AC2C-C19C-4F7E-A82A-BA2D8EE910EB}" type="datetimeFigureOut">
               <a:rPr lang="ko-KR" altLang="en-US" smtClean="0"/>
-              <a:t>2017-07-25</a:t>
+              <a:t>2017-07-14</a:t>
             </a:fld>
             <a:endParaRPr lang="ko-KR" altLang="en-US"/>
           </a:p>
@@ -464,7 +464,7 @@
           <a:p>
             <a:fld id="{0649AC2C-C19C-4F7E-A82A-BA2D8EE910EB}" type="datetimeFigureOut">
               <a:rPr lang="ko-KR" altLang="en-US" smtClean="0"/>
-              <a:t>2017-07-25</a:t>
+              <a:t>2017-07-14</a:t>
             </a:fld>
             <a:endParaRPr lang="ko-KR" altLang="en-US"/>
           </a:p>
@@ -644,7 +644,7 @@
           <a:p>
             <a:fld id="{0649AC2C-C19C-4F7E-A82A-BA2D8EE910EB}" type="datetimeFigureOut">
               <a:rPr lang="ko-KR" altLang="en-US" smtClean="0"/>
-              <a:t>2017-07-25</a:t>
+              <a:t>2017-07-14</a:t>
             </a:fld>
             <a:endParaRPr lang="ko-KR" altLang="en-US"/>
           </a:p>
@@ -814,7 +814,7 @@
           <a:p>
             <a:fld id="{0649AC2C-C19C-4F7E-A82A-BA2D8EE910EB}" type="datetimeFigureOut">
               <a:rPr lang="ko-KR" altLang="en-US" smtClean="0"/>
-              <a:t>2017-07-25</a:t>
+              <a:t>2017-07-14</a:t>
             </a:fld>
             <a:endParaRPr lang="ko-KR" altLang="en-US"/>
           </a:p>
@@ -1060,7 +1060,7 @@
           <a:p>
             <a:fld id="{0649AC2C-C19C-4F7E-A82A-BA2D8EE910EB}" type="datetimeFigureOut">
               <a:rPr lang="ko-KR" altLang="en-US" smtClean="0"/>
-              <a:t>2017-07-25</a:t>
+              <a:t>2017-07-14</a:t>
             </a:fld>
             <a:endParaRPr lang="ko-KR" altLang="en-US"/>
           </a:p>
@@ -1348,7 +1348,7 @@
           <a:p>
             <a:fld id="{0649AC2C-C19C-4F7E-A82A-BA2D8EE910EB}" type="datetimeFigureOut">
               <a:rPr lang="ko-KR" altLang="en-US" smtClean="0"/>
-              <a:t>2017-07-25</a:t>
+              <a:t>2017-07-14</a:t>
             </a:fld>
             <a:endParaRPr lang="ko-KR" altLang="en-US"/>
           </a:p>
@@ -1770,7 +1770,7 @@
           <a:p>
             <a:fld id="{0649AC2C-C19C-4F7E-A82A-BA2D8EE910EB}" type="datetimeFigureOut">
               <a:rPr lang="ko-KR" altLang="en-US" smtClean="0"/>
-              <a:t>2017-07-25</a:t>
+              <a:t>2017-07-14</a:t>
             </a:fld>
             <a:endParaRPr lang="ko-KR" altLang="en-US"/>
           </a:p>
@@ -1888,7 +1888,7 @@
           <a:p>
             <a:fld id="{0649AC2C-C19C-4F7E-A82A-BA2D8EE910EB}" type="datetimeFigureOut">
               <a:rPr lang="ko-KR" altLang="en-US" smtClean="0"/>
-              <a:t>2017-07-25</a:t>
+              <a:t>2017-07-14</a:t>
             </a:fld>
             <a:endParaRPr lang="ko-KR" altLang="en-US"/>
           </a:p>
@@ -1983,7 +1983,7 @@
           <a:p>
             <a:fld id="{0649AC2C-C19C-4F7E-A82A-BA2D8EE910EB}" type="datetimeFigureOut">
               <a:rPr lang="ko-KR" altLang="en-US" smtClean="0"/>
-              <a:t>2017-07-25</a:t>
+              <a:t>2017-07-14</a:t>
             </a:fld>
             <a:endParaRPr lang="ko-KR" altLang="en-US"/>
           </a:p>
@@ -2260,7 +2260,7 @@
           <a:p>
             <a:fld id="{0649AC2C-C19C-4F7E-A82A-BA2D8EE910EB}" type="datetimeFigureOut">
               <a:rPr lang="ko-KR" altLang="en-US" smtClean="0"/>
-              <a:t>2017-07-25</a:t>
+              <a:t>2017-07-14</a:t>
             </a:fld>
             <a:endParaRPr lang="ko-KR" altLang="en-US"/>
           </a:p>
@@ -2513,7 +2513,7 @@
           <a:p>
             <a:fld id="{0649AC2C-C19C-4F7E-A82A-BA2D8EE910EB}" type="datetimeFigureOut">
               <a:rPr lang="ko-KR" altLang="en-US" smtClean="0"/>
-              <a:t>2017-07-25</a:t>
+              <a:t>2017-07-14</a:t>
             </a:fld>
             <a:endParaRPr lang="ko-KR" altLang="en-US"/>
           </a:p>
@@ -2726,7 +2726,7 @@
           <a:p>
             <a:fld id="{0649AC2C-C19C-4F7E-A82A-BA2D8EE910EB}" type="datetimeFigureOut">
               <a:rPr lang="ko-KR" altLang="en-US" smtClean="0"/>
-              <a:t>2017-07-25</a:t>
+              <a:t>2017-07-14</a:t>
             </a:fld>
             <a:endParaRPr lang="ko-KR" altLang="en-US"/>
           </a:p>
@@ -3166,24 +3166,16 @@
           <a:p>
             <a:pPr lvl="1"/>
             <a:r>
-              <a:rPr lang="ko-KR" altLang="en-US" dirty="0" smtClean="0"/>
+              <a:rPr lang="ko-KR" altLang="en-US" smtClean="0"/>
               <a:t>등</a:t>
             </a:r>
             <a:r>
-              <a:rPr lang="ko-KR" altLang="en-US" dirty="0"/>
+              <a:rPr lang="ko-KR" altLang="en-US"/>
               <a:t>급</a:t>
             </a:r>
             <a:r>
-              <a:rPr lang="ko-KR" altLang="en-US" dirty="0" smtClean="0"/>
-              <a:t> </a:t>
-            </a:r>
-            <a:r>
-              <a:rPr lang="ko-KR" altLang="en-US" dirty="0" smtClean="0"/>
-              <a:t>이름 </a:t>
-            </a:r>
-            <a:r>
-              <a:rPr lang="en-US" altLang="ko-KR" smtClean="0"/>
-              <a:t>ttasdtg</a:t>
+              <a:rPr lang="ko-KR" altLang="en-US" smtClean="0"/>
+              <a:t> 이름</a:t>
             </a:r>
             <a:endParaRPr lang="en-US" altLang="ko-KR" dirty="0" smtClean="0"/>
           </a:p>
@@ -3820,6 +3812,7 @@
               <a:rPr lang="ko-KR" altLang="en-US" dirty="0"/>
               <a:t>도</a:t>
             </a:r>
+            <a:endParaRPr lang="ko-KR" altLang="en-US" dirty="0"/>
           </a:p>
         </p:txBody>
       </p:sp>

</xml_diff>